<commit_message>
Replaced ipython with jupyter in Overview presentation and corresponding pdf
</commit_message>
<xml_diff>
--- a/presentations/Overview.pptx
+++ b/presentations/Overview.pptx
@@ -202,19 +202,19 @@
                 <c:formatCode>General</c:formatCode>
                 <c:ptCount val="5"/>
                 <c:pt idx="0">
-                  <c:v>2010</c:v>
+                  <c:v>2010.0</c:v>
                 </c:pt>
                 <c:pt idx="1">
-                  <c:v>2011</c:v>
+                  <c:v>2011.0</c:v>
                 </c:pt>
                 <c:pt idx="2">
-                  <c:v>2012</c:v>
+                  <c:v>2012.0</c:v>
                 </c:pt>
                 <c:pt idx="3">
-                  <c:v>2013</c:v>
+                  <c:v>2013.0</c:v>
                 </c:pt>
                 <c:pt idx="4">
-                  <c:v>2014</c:v>
+                  <c:v>2014.0</c:v>
                 </c:pt>
               </c:numCache>
             </c:numRef>
@@ -226,19 +226,19 @@
                 <c:formatCode>General</c:formatCode>
                 <c:ptCount val="5"/>
                 <c:pt idx="0">
-                  <c:v>2</c:v>
+                  <c:v>2.0</c:v>
                 </c:pt>
                 <c:pt idx="1">
-                  <c:v>19</c:v>
+                  <c:v>19.0</c:v>
                 </c:pt>
                 <c:pt idx="2">
-                  <c:v>57</c:v>
+                  <c:v>57.0</c:v>
                 </c:pt>
                 <c:pt idx="3">
-                  <c:v>60</c:v>
+                  <c:v>60.0</c:v>
                 </c:pt>
                 <c:pt idx="4">
-                  <c:v>60</c:v>
+                  <c:v>60.0</c:v>
                 </c:pt>
               </c:numCache>
             </c:numRef>
@@ -269,19 +269,19 @@
                 <c:formatCode>General</c:formatCode>
                 <c:ptCount val="5"/>
                 <c:pt idx="0">
-                  <c:v>2010</c:v>
+                  <c:v>2010.0</c:v>
                 </c:pt>
                 <c:pt idx="1">
-                  <c:v>2011</c:v>
+                  <c:v>2011.0</c:v>
                 </c:pt>
                 <c:pt idx="2">
-                  <c:v>2012</c:v>
+                  <c:v>2012.0</c:v>
                 </c:pt>
                 <c:pt idx="3">
-                  <c:v>2013</c:v>
+                  <c:v>2013.0</c:v>
                 </c:pt>
                 <c:pt idx="4">
-                  <c:v>2014</c:v>
+                  <c:v>2014.0</c:v>
                 </c:pt>
               </c:numCache>
             </c:numRef>
@@ -293,19 +293,19 @@
                 <c:formatCode>General</c:formatCode>
                 <c:ptCount val="5"/>
                 <c:pt idx="0">
-                  <c:v>7</c:v>
+                  <c:v>7.0</c:v>
                 </c:pt>
                 <c:pt idx="1">
-                  <c:v>2</c:v>
+                  <c:v>2.0</c:v>
                 </c:pt>
                 <c:pt idx="2">
-                  <c:v>9</c:v>
+                  <c:v>9.0</c:v>
                 </c:pt>
                 <c:pt idx="3">
-                  <c:v>12</c:v>
+                  <c:v>12.0</c:v>
                 </c:pt>
                 <c:pt idx="4">
-                  <c:v>7</c:v>
+                  <c:v>7.0</c:v>
                 </c:pt>
               </c:numCache>
             </c:numRef>
@@ -336,19 +336,19 @@
                 <c:formatCode>General</c:formatCode>
                 <c:ptCount val="5"/>
                 <c:pt idx="0">
-                  <c:v>2010</c:v>
+                  <c:v>2010.0</c:v>
                 </c:pt>
                 <c:pt idx="1">
-                  <c:v>2011</c:v>
+                  <c:v>2011.0</c:v>
                 </c:pt>
                 <c:pt idx="2">
-                  <c:v>2012</c:v>
+                  <c:v>2012.0</c:v>
                 </c:pt>
                 <c:pt idx="3">
-                  <c:v>2013</c:v>
+                  <c:v>2013.0</c:v>
                 </c:pt>
                 <c:pt idx="4">
-                  <c:v>2014</c:v>
+                  <c:v>2014.0</c:v>
                 </c:pt>
               </c:numCache>
             </c:numRef>
@@ -360,19 +360,19 @@
                 <c:formatCode>General</c:formatCode>
                 <c:ptCount val="5"/>
                 <c:pt idx="0">
-                  <c:v>2</c:v>
+                  <c:v>2.0</c:v>
                 </c:pt>
                 <c:pt idx="1">
-                  <c:v>4</c:v>
+                  <c:v>4.0</c:v>
                 </c:pt>
                 <c:pt idx="2">
-                  <c:v>2</c:v>
+                  <c:v>2.0</c:v>
                 </c:pt>
                 <c:pt idx="3">
-                  <c:v>9</c:v>
+                  <c:v>9.0</c:v>
                 </c:pt>
                 <c:pt idx="4">
-                  <c:v>5</c:v>
+                  <c:v>5.0</c:v>
                 </c:pt>
               </c:numCache>
             </c:numRef>
@@ -389,11 +389,11 @@
         </c:dLbls>
         <c:marker val="1"/>
         <c:smooth val="0"/>
-        <c:axId val="45871872"/>
-        <c:axId val="45873408"/>
+        <c:axId val="-2144558808"/>
+        <c:axId val="-2144555832"/>
       </c:lineChart>
       <c:catAx>
-        <c:axId val="45871872"/>
+        <c:axId val="-2144558808"/>
         <c:scaling>
           <c:orientation val="minMax"/>
         </c:scaling>
@@ -403,7 +403,7 @@
         <c:majorTickMark val="out"/>
         <c:minorTickMark val="none"/>
         <c:tickLblPos val="nextTo"/>
-        <c:crossAx val="45873408"/>
+        <c:crossAx val="-2144555832"/>
         <c:crosses val="autoZero"/>
         <c:auto val="1"/>
         <c:lblAlgn val="ctr"/>
@@ -411,7 +411,7 @@
         <c:noMultiLvlLbl val="0"/>
       </c:catAx>
       <c:valAx>
-        <c:axId val="45873408"/>
+        <c:axId val="-2144555832"/>
         <c:scaling>
           <c:orientation val="minMax"/>
         </c:scaling>
@@ -422,7 +422,7 @@
         <c:majorTickMark val="out"/>
         <c:minorTickMark val="none"/>
         <c:tickLblPos val="nextTo"/>
-        <c:crossAx val="45871872"/>
+        <c:crossAx val="-2144558808"/>
         <c:crosses val="autoZero"/>
         <c:crossBetween val="between"/>
       </c:valAx>
@@ -525,7 +525,7 @@
             <a:fld id="{8BC243FF-AE77-4DF4-8CCC-66C2282A886D}" type="datetimeFigureOut">
               <a:rPr lang="en-US" smtClean="0"/>
               <a:pPr/>
-              <a:t>7/20/2015</a:t>
+              <a:t>10/16/16</a:t>
             </a:fld>
             <a:endParaRPr lang="en-US"/>
           </a:p>
@@ -712,7 +712,7 @@
             <a:fld id="{D0858862-58BF-44B0-8200-136196B2F4C7}" type="datetimeFigureOut">
               <a:rPr lang="en-US"/>
               <a:pPr/>
-              <a:t>7/20/2015</a:t>
+              <a:t>10/16/16</a:t>
             </a:fld>
             <a:endParaRPr lang="en-US"/>
           </a:p>
@@ -1302,7 +1302,7 @@
             <a:fld id="{F30AFB2F-5EF3-4CAB-B2FE-BA0A39E220C6}" type="datetimeFigureOut">
               <a:rPr lang="en-US"/>
               <a:pPr/>
-              <a:t>7/20/2015</a:t>
+              <a:t>10/16/16</a:t>
             </a:fld>
             <a:endParaRPr lang="en-US"/>
           </a:p>
@@ -1484,7 +1484,7 @@
             <a:fld id="{778D11B3-B33D-4421-B117-CBEAEEDF3B56}" type="datetimeFigureOut">
               <a:rPr lang="en-US"/>
               <a:pPr/>
-              <a:t>7/20/2015</a:t>
+              <a:t>10/16/16</a:t>
             </a:fld>
             <a:endParaRPr lang="en-US"/>
           </a:p>
@@ -1676,7 +1676,7 @@
             <a:fld id="{E546F523-601C-4AE6-94D0-B6E0B6B185B6}" type="datetimeFigureOut">
               <a:rPr lang="en-US"/>
               <a:pPr/>
-              <a:t>7/20/2015</a:t>
+              <a:t>10/16/16</a:t>
             </a:fld>
             <a:endParaRPr lang="en-US"/>
           </a:p>
@@ -1858,7 +1858,7 @@
             <a:fld id="{2755933F-A7CD-46E1-AE74-F4B25B8A5888}" type="datetimeFigureOut">
               <a:rPr lang="en-US"/>
               <a:pPr/>
-              <a:t>7/20/2015</a:t>
+              <a:t>10/16/16</a:t>
             </a:fld>
             <a:endParaRPr lang="en-US"/>
           </a:p>
@@ -2116,7 +2116,7 @@
             <a:fld id="{E2DD70BF-DD26-4542-8867-0654A849CEFE}" type="datetimeFigureOut">
               <a:rPr lang="en-US"/>
               <a:pPr/>
-              <a:t>7/20/2015</a:t>
+              <a:t>10/16/16</a:t>
             </a:fld>
             <a:endParaRPr lang="en-US"/>
           </a:p>
@@ -2416,7 +2416,7 @@
             <a:fld id="{80E5E274-32FD-4A30-AF3B-64174B6C2069}" type="datetimeFigureOut">
               <a:rPr lang="en-US"/>
               <a:pPr/>
-              <a:t>7/20/2015</a:t>
+              <a:t>10/16/16</a:t>
             </a:fld>
             <a:endParaRPr lang="en-US"/>
           </a:p>
@@ -2850,7 +2850,7 @@
             <a:fld id="{02E83F24-3119-487E-BFBC-C70771716A50}" type="datetimeFigureOut">
               <a:rPr lang="en-US"/>
               <a:pPr/>
-              <a:t>7/20/2015</a:t>
+              <a:t>10/16/16</a:t>
             </a:fld>
             <a:endParaRPr lang="en-US"/>
           </a:p>
@@ -2980,7 +2980,7 @@
             <a:fld id="{68DD7F26-701B-47E4-A59A-055252B49D89}" type="datetimeFigureOut">
               <a:rPr lang="en-US"/>
               <a:pPr/>
-              <a:t>7/20/2015</a:t>
+              <a:t>10/16/16</a:t>
             </a:fld>
             <a:endParaRPr lang="en-US"/>
           </a:p>
@@ -3087,7 +3087,7 @@
             <a:fld id="{CACE95DC-D4F0-4723-9A98-48338ADC933B}" type="datetimeFigureOut">
               <a:rPr lang="en-US"/>
               <a:pPr/>
-              <a:t>7/20/2015</a:t>
+              <a:t>10/16/16</a:t>
             </a:fld>
             <a:endParaRPr lang="en-US"/>
           </a:p>
@@ -3376,7 +3376,7 @@
             <a:fld id="{E253DCD9-B885-4B2F-841C-5BE81A85EC36}" type="datetimeFigureOut">
               <a:rPr lang="en-US"/>
               <a:pPr/>
-              <a:t>7/20/2015</a:t>
+              <a:t>10/16/16</a:t>
             </a:fld>
             <a:endParaRPr lang="en-US"/>
           </a:p>
@@ -3644,7 +3644,7 @@
             <a:fld id="{292D2DE9-A858-4AF6-BFB6-E7BE7517C326}" type="datetimeFigureOut">
               <a:rPr lang="en-US"/>
               <a:pPr/>
-              <a:t>7/20/2015</a:t>
+              <a:t>10/16/16</a:t>
             </a:fld>
             <a:endParaRPr lang="en-US"/>
           </a:p>
@@ -3886,7 +3886,7 @@
             <a:fld id="{28771537-7EF8-4AE1-AA34-66E7A6D640CE}" type="datetimeFigureOut">
               <a:rPr lang="en-US"/>
               <a:pPr/>
-              <a:t>7/20/2015</a:t>
+              <a:t>10/16/16</a:t>
             </a:fld>
             <a:endParaRPr lang="en-US"/>
           </a:p>
@@ -4599,7 +4599,7 @@
   <p:timing>
     <p:tnLst>
       <p:par>
-        <p:cTn id="1" dur="indefinite" restart="never" nodeType="tmRoot"/>
+        <p:cTn xmlns:p14="http://schemas.microsoft.com/office/powerpoint/2010/main" id="1" dur="indefinite" restart="never" nodeType="tmRoot"/>
       </p:par>
     </p:tnLst>
   </p:timing>
@@ -5167,7 +5167,7 @@
   <p:timing>
     <p:tnLst>
       <p:par>
-        <p:cTn id="1" dur="indefinite" restart="never" nodeType="tmRoot"/>
+        <p:cTn xmlns:p14="http://schemas.microsoft.com/office/powerpoint/2010/main" id="1" dur="indefinite" restart="never" nodeType="tmRoot"/>
       </p:par>
     </p:tnLst>
   </p:timing>
@@ -5328,7 +5328,7 @@
   <p:timing>
     <p:tnLst>
       <p:par>
-        <p:cTn id="1" dur="indefinite" restart="never" nodeType="tmRoot"/>
+        <p:cTn xmlns:p14="http://schemas.microsoft.com/office/powerpoint/2010/main" id="1" dur="indefinite" restart="never" nodeType="tmRoot"/>
       </p:par>
     </p:tnLst>
   </p:timing>
@@ -5453,7 +5453,7 @@
   <p:timing>
     <p:tnLst>
       <p:par>
-        <p:cTn id="1" dur="indefinite" restart="never" nodeType="tmRoot"/>
+        <p:cTn xmlns:p14="http://schemas.microsoft.com/office/powerpoint/2010/main" id="1" dur="indefinite" restart="never" nodeType="tmRoot"/>
       </p:par>
     </p:tnLst>
   </p:timing>
@@ -5526,11 +5526,15 @@
             </a:r>
             <a:r>
               <a:rPr lang="en-US" sz="2800" dirty="0" err="1" smtClean="0"/>
-              <a:t>ipython</a:t>
+              <a:t>jupyter</a:t>
             </a:r>
             <a:r>
               <a:rPr lang="en-US" sz="2800" dirty="0" smtClean="0"/>
-              <a:t> notebook. It is good for presentations and sharing finished code. It is not so good for code development. Here are some Python IDEs:</a:t>
+              <a:t> notebook</a:t>
+            </a:r>
+            <a:r>
+              <a:rPr lang="en-US" sz="2800" dirty="0" smtClean="0"/>
+              <a:t>. It is good for presentations and sharing finished code. It is not so good for code development. Here are some Python IDEs:</a:t>
             </a:r>
           </a:p>
           <a:p>
@@ -5543,11 +5547,7 @@
             </a:r>
             <a:r>
               <a:rPr lang="en-US" sz="2400" dirty="0" smtClean="0"/>
-              <a:t> </a:t>
-            </a:r>
-            <a:r>
-              <a:rPr lang="en-US" sz="2400" dirty="0" smtClean="0"/>
-              <a:t>(Scientific Python </a:t>
+              <a:t> (Scientific Python </a:t>
             </a:r>
             <a:r>
               <a:rPr lang="en-US" sz="2400" dirty="0" err="1" smtClean="0"/>
@@ -5575,16 +5575,22 @@
               <a:t>Emacs </a:t>
             </a:r>
             <a:r>
-              <a:rPr lang="en-US" sz="2400" dirty="0" err="1" smtClean="0">
-                <a:hlinkClick r:id="rId3"/>
-              </a:rPr>
-              <a:t>Ipython</a:t>
-            </a:r>
-            <a:r>
               <a:rPr lang="en-US" sz="2400" dirty="0" smtClean="0">
                 <a:hlinkClick r:id="rId3"/>
               </a:rPr>
-              <a:t> Notebook</a:t>
+              <a:t>jupyter</a:t>
+            </a:r>
+            <a:r>
+              <a:rPr lang="en-US" sz="2400" dirty="0" smtClean="0">
+                <a:hlinkClick r:id="rId3"/>
+              </a:rPr>
+              <a:t> </a:t>
+            </a:r>
+            <a:r>
+              <a:rPr lang="en-US" sz="2400" dirty="0" smtClean="0">
+                <a:hlinkClick r:id="rId3"/>
+              </a:rPr>
+              <a:t>Notebook</a:t>
             </a:r>
             <a:endParaRPr lang="en-US" sz="2400" dirty="0" smtClean="0"/>
           </a:p>
@@ -5608,19 +5614,7 @@
             </a:r>
             <a:r>
               <a:rPr lang="en-US" sz="2400" dirty="0" smtClean="0"/>
-              <a:t>, a hosted </a:t>
-            </a:r>
-            <a:r>
-              <a:rPr lang="en-US" sz="2400" dirty="0" smtClean="0"/>
-              <a:t>Python </a:t>
-            </a:r>
-            <a:r>
-              <a:rPr lang="en-US" sz="2400" dirty="0" smtClean="0"/>
-              <a:t>data analysis </a:t>
-            </a:r>
-            <a:r>
-              <a:rPr lang="en-US" sz="2400" dirty="0" smtClean="0"/>
-              <a:t>environment</a:t>
+              <a:t>, a hosted Python data analysis environment</a:t>
             </a:r>
           </a:p>
           <a:p>
@@ -5659,7 +5653,7 @@
   <p:timing>
     <p:tnLst>
       <p:par>
-        <p:cTn id="1" dur="indefinite" restart="never" nodeType="tmRoot"/>
+        <p:cTn xmlns:p14="http://schemas.microsoft.com/office/powerpoint/2010/main" id="1" dur="indefinite" restart="never" nodeType="tmRoot"/>
       </p:par>
     </p:tnLst>
   </p:timing>
@@ -5828,7 +5822,7 @@
   <p:timing>
     <p:tnLst>
       <p:par>
-        <p:cTn id="1" dur="indefinite" restart="never" nodeType="tmRoot"/>
+        <p:cTn xmlns:p14="http://schemas.microsoft.com/office/powerpoint/2010/main" id="1" dur="indefinite" restart="never" nodeType="tmRoot"/>
       </p:par>
     </p:tnLst>
   </p:timing>
@@ -5997,7 +5991,7 @@
   <p:timing>
     <p:tnLst>
       <p:par>
-        <p:cTn id="1" dur="indefinite" restart="never" nodeType="tmRoot"/>
+        <p:cTn xmlns:p14="http://schemas.microsoft.com/office/powerpoint/2010/main" id="1" dur="indefinite" restart="never" nodeType="tmRoot"/>
       </p:par>
     </p:tnLst>
   </p:timing>
@@ -6079,12 +6073,13 @@
           <a:p>
             <a:r>
               <a:rPr lang="en-US" dirty="0" err="1" smtClean="0"/>
-              <a:t>IPython</a:t>
+              <a:t>Jupyter</a:t>
             </a:r>
             <a:r>
               <a:rPr lang="en-US" dirty="0" smtClean="0"/>
               <a:t> Notebook</a:t>
             </a:r>
+            <a:endParaRPr lang="en-US" dirty="0" smtClean="0"/>
           </a:p>
           <a:p>
             <a:r>
@@ -6104,11 +6099,7 @@
           <a:p>
             <a:r>
               <a:rPr lang="en-US" dirty="0" smtClean="0"/>
-              <a:t>Read and </a:t>
-            </a:r>
-            <a:r>
-              <a:rPr lang="en-US" dirty="0" smtClean="0"/>
-              <a:t>write netCDF files</a:t>
+              <a:t>Read and write netCDF files</a:t>
             </a:r>
           </a:p>
           <a:p>
@@ -6133,11 +6124,7 @@
           <a:p>
             <a:r>
               <a:rPr lang="en-US" dirty="0" smtClean="0"/>
-              <a:t>And </a:t>
-            </a:r>
-            <a:r>
-              <a:rPr lang="en-US" dirty="0" smtClean="0"/>
-              <a:t>lots more …</a:t>
+              <a:t>And lots more …</a:t>
             </a:r>
             <a:endParaRPr lang="en-US" dirty="0"/>
           </a:p>
@@ -6151,7 +6138,7 @@
   <p:timing>
     <p:tnLst>
       <p:par>
-        <p:cTn id="1" dur="indefinite" restart="never" nodeType="tmRoot"/>
+        <p:cTn xmlns:p14="http://schemas.microsoft.com/office/powerpoint/2010/main" id="1" dur="indefinite" restart="never" nodeType="tmRoot"/>
       </p:par>
     </p:tnLst>
   </p:timing>
@@ -6341,7 +6328,7 @@
   <p:timing>
     <p:tnLst>
       <p:par>
-        <p:cTn id="1" dur="indefinite" restart="never" nodeType="tmRoot"/>
+        <p:cTn xmlns:p14="http://schemas.microsoft.com/office/powerpoint/2010/main" id="1" dur="indefinite" restart="never" nodeType="tmRoot"/>
       </p:par>
     </p:tnLst>
   </p:timing>
@@ -6470,7 +6457,7 @@
   <p:timing>
     <p:tnLst>
       <p:par>
-        <p:cTn id="1" dur="indefinite" restart="never" nodeType="tmRoot"/>
+        <p:cTn xmlns:p14="http://schemas.microsoft.com/office/powerpoint/2010/main" id="1" dur="indefinite" restart="never" nodeType="tmRoot"/>
       </p:par>
     </p:tnLst>
   </p:timing>
@@ -6605,7 +6592,7 @@
   <p:timing>
     <p:tnLst>
       <p:par>
-        <p:cTn id="1" dur="indefinite" restart="never" nodeType="tmRoot"/>
+        <p:cTn xmlns:p14="http://schemas.microsoft.com/office/powerpoint/2010/main" id="1" dur="indefinite" restart="never" nodeType="tmRoot"/>
       </p:par>
     </p:tnLst>
   </p:timing>
@@ -6661,14 +6648,14 @@
           <a:noFill/>
           <a:ln/>
           <a:extLst>
-            <a:ext uri="{909E8E84-426E-40DD-AFC4-6F175D3DCCD1}">
+            <a:ext uri="{909E8E84-426E-40dd-AFC4-6F175D3DCCD1}">
               <a14:hiddenFill xmlns:a14="http://schemas.microsoft.com/office/drawing/2010/main">
                 <a:solidFill>
                   <a:srgbClr val="FFFFFF"/>
                 </a:solidFill>
               </a14:hiddenFill>
             </a:ext>
-            <a:ext uri="{91240B29-F687-4F45-9708-019B960494DF}">
+            <a:ext uri="{91240B29-F687-4f45-9708-019B960494DF}">
               <a14:hiddenLine xmlns:a14="http://schemas.microsoft.com/office/drawing/2010/main" w="9525">
                 <a:solidFill>
                   <a:srgbClr val="000000"/>
@@ -6678,7 +6665,7 @@
                 <a:tailEnd/>
               </a14:hiddenLine>
             </a:ext>
-            <a:ext uri="{AF507438-7753-43E0-B8FC-AC1667EBCBE1}">
+            <a:ext uri="{AF507438-7753-43e0-B8FC-AC1667EBCBE1}">
               <a14:hiddenEffects xmlns:a14="http://schemas.microsoft.com/office/drawing/2010/main">
                 <a:effectLst>
                   <a:outerShdw dist="35921" dir="2700000" algn="ctr" rotWithShape="0">
@@ -7148,7 +7135,7 @@
   <p:timing>
     <p:tnLst>
       <p:par>
-        <p:cTn id="1" dur="indefinite" restart="never" nodeType="tmRoot"/>
+        <p:cTn xmlns:p14="http://schemas.microsoft.com/office/powerpoint/2010/main" id="1" dur="indefinite" restart="never" nodeType="tmRoot"/>
       </p:par>
     </p:tnLst>
   </p:timing>
@@ -7508,7 +7495,7 @@
   <p:timing>
     <p:tnLst>
       <p:par>
-        <p:cTn id="1" dur="indefinite" restart="never" nodeType="tmRoot"/>
+        <p:cTn xmlns:p14="http://schemas.microsoft.com/office/powerpoint/2010/main" id="1" dur="indefinite" restart="never" nodeType="tmRoot"/>
       </p:par>
     </p:tnLst>
   </p:timing>
@@ -7652,7 +7639,7 @@
   <p:timing>
     <p:tnLst>
       <p:par>
-        <p:cTn id="1" dur="indefinite" restart="never" nodeType="tmRoot"/>
+        <p:cTn xmlns:p14="http://schemas.microsoft.com/office/powerpoint/2010/main" id="1" dur="indefinite" restart="never" nodeType="tmRoot"/>
       </p:par>
     </p:tnLst>
   </p:timing>
@@ -7866,7 +7853,7 @@
   <p:timing>
     <p:tnLst>
       <p:par>
-        <p:cTn id="1" dur="indefinite" restart="never" nodeType="tmRoot"/>
+        <p:cTn xmlns:p14="http://schemas.microsoft.com/office/powerpoint/2010/main" id="1" dur="indefinite" restart="never" nodeType="tmRoot"/>
       </p:par>
     </p:tnLst>
   </p:timing>
@@ -8025,7 +8012,7 @@
   <p:timing>
     <p:tnLst>
       <p:par>
-        <p:cTn id="1" dur="indefinite" restart="never" nodeType="tmRoot"/>
+        <p:cTn xmlns:p14="http://schemas.microsoft.com/office/powerpoint/2010/main" id="1" dur="indefinite" restart="never" nodeType="tmRoot"/>
       </p:par>
     </p:tnLst>
   </p:timing>

</xml_diff>